<commit_message>
[GT-169] 4차년도 테스트 케이스 작성 http://jira.iitp.cubrid.org/browse/GT-169
- 기존 테스트 케이스에서 4차년도 변경 된 사항에 대해서 내용을 변경하여 적용
- 4차년도에 추가 된 기능을 대상으로 테스트 케이스를 추가(No.4-시각화창-2 PPT, Excel)
</commit_message>
<xml_diff>
--- a/ViT_docs/Test scenario-ViT/No.1-연결탐색기(Database Navigator).pptx
+++ b/ViT_docs/Test scenario-ViT/No.1-연결탐색기(Database Navigator).pptx
@@ -6,10 +6,10 @@
     <p:sldMasterId id="2147484752" r:id="rId5"/>
   </p:sldMasterIdLst>
   <p:notesMasterIdLst>
-    <p:notesMasterId r:id="rId18"/>
+    <p:notesMasterId r:id="rId17"/>
   </p:notesMasterIdLst>
   <p:handoutMasterIdLst>
-    <p:handoutMasterId r:id="rId19"/>
+    <p:handoutMasterId r:id="rId18"/>
   </p:handoutMasterIdLst>
   <p:sldIdLst>
     <p:sldId id="487" r:id="rId6"/>
@@ -23,24 +23,23 @@
     <p:sldId id="773" r:id="rId14"/>
     <p:sldId id="774" r:id="rId15"/>
     <p:sldId id="775" r:id="rId16"/>
-    <p:sldId id="776" r:id="rId17"/>
   </p:sldIdLst>
   <p:sldSz cx="9144000" cy="6858000" type="screen4x3"/>
   <p:notesSz cx="6669088" cy="9928225"/>
   <p:embeddedFontLst>
     <p:embeddedFont>
       <p:font typeface="나눔고딕" panose="020D0604000000000000" pitchFamily="50" charset="-127"/>
-      <p:regular r:id="rId20"/>
+      <p:regular r:id="rId19"/>
+      <p:bold r:id="rId20"/>
+    </p:embeddedFont>
+    <p:embeddedFont>
+      <p:font typeface="나눔고딕 Bold" panose="020D0804000000000000" pitchFamily="50" charset="-127"/>
       <p:bold r:id="rId21"/>
     </p:embeddedFont>
     <p:embeddedFont>
-      <p:font typeface="나눔고딕 Bold" panose="020D0804000000000000" pitchFamily="50" charset="-127"/>
-      <p:bold r:id="rId22"/>
-    </p:embeddedFont>
-    <p:embeddedFont>
       <p:font typeface="맑은 고딕" panose="020B0503020000020004" pitchFamily="50" charset="-127"/>
-      <p:regular r:id="rId23"/>
-      <p:bold r:id="rId24"/>
+      <p:regular r:id="rId22"/>
+      <p:bold r:id="rId23"/>
     </p:embeddedFont>
   </p:embeddedFontLst>
   <p:defaultTextStyle>
@@ -4619,379 +4618,6 @@
 </p:sld>
 </file>
 
-<file path=ppt/slides/slide12.xml><?xml version="1.0" encoding="utf-8"?>
-<p:sld xmlns:a="http://schemas.openxmlformats.org/drawingml/2006/main" xmlns:r="http://schemas.openxmlformats.org/officeDocument/2006/relationships" xmlns:p="http://schemas.openxmlformats.org/presentationml/2006/main">
-  <p:cSld>
-    <p:spTree>
-      <p:nvGrpSpPr>
-        <p:cNvPr id="1" name=""/>
-        <p:cNvGrpSpPr/>
-        <p:nvPr/>
-      </p:nvGrpSpPr>
-      <p:grpSpPr>
-        <a:xfrm>
-          <a:off x="0" y="0"/>
-          <a:ext cx="0" cy="0"/>
-          <a:chOff x="0" y="0"/>
-          <a:chExt cx="0" cy="0"/>
-        </a:xfrm>
-      </p:grpSpPr>
-      <p:sp>
-        <p:nvSpPr>
-          <p:cNvPr id="49156" name="내용 개체 틀 4"/>
-          <p:cNvSpPr>
-            <a:spLocks noGrp="1"/>
-          </p:cNvSpPr>
-          <p:nvPr>
-            <p:ph idx="1"/>
-          </p:nvPr>
-        </p:nvSpPr>
-        <p:spPr bwMode="auto">
-          <a:noFill/>
-          <a:extLst>
-            <a:ext uri="{909E8E84-426E-40DD-AFC4-6F175D3DCCD1}">
-              <a14:hiddenFill xmlns:a14="http://schemas.microsoft.com/office/drawing/2010/main">
-                <a:solidFill>
-                  <a:srgbClr val="FFFFFF"/>
-                </a:solidFill>
-              </a14:hiddenFill>
-            </a:ext>
-            <a:ext uri="{91240B29-F687-4F45-9708-019B960494DF}">
-              <a14:hiddenLine xmlns:a14="http://schemas.microsoft.com/office/drawing/2010/main" w="9525">
-                <a:solidFill>
-                  <a:srgbClr val="000000"/>
-                </a:solidFill>
-                <a:miter lim="800000"/>
-                <a:headEnd/>
-                <a:tailEnd/>
-              </a14:hiddenLine>
-            </a:ext>
-          </a:extLst>
-        </p:spPr>
-        <p:txBody>
-          <a:bodyPr vert="horz" wrap="square" lIns="91440" tIns="45720" rIns="91440" bIns="45720" numCol="1" anchor="t" anchorCtr="0" compatLnSpc="1">
-            <a:prstTxWarp prst="textNoShape">
-              <a:avLst/>
-            </a:prstTxWarp>
-          </a:bodyPr>
-          <a:lstStyle/>
-          <a:p>
-            <a:pPr>
-              <a:buFontTx/>
-              <a:buChar char="-"/>
-            </a:pPr>
-            <a:r>
-              <a:rPr lang="en-US" altLang="ko-KR">
-                <a:latin typeface="+mn-lt"/>
-                <a:ea typeface="+mj-ea"/>
-              </a:rPr>
-              <a:t>demodb </a:t>
-            </a:r>
-            <a:r>
-              <a:rPr lang="en-US" altLang="ko-KR" dirty="0">
-                <a:latin typeface="+mn-lt"/>
-                <a:ea typeface="+mj-ea"/>
-              </a:rPr>
-              <a:t>1 </a:t>
-            </a:r>
-            <a:r>
-              <a:rPr lang="ko-KR" altLang="en-US" dirty="0">
-                <a:latin typeface="+mn-lt"/>
-                <a:ea typeface="+mj-ea"/>
-              </a:rPr>
-              <a:t>삭제 </a:t>
-            </a:r>
-            <a:r>
-              <a:rPr lang="en-US" altLang="ko-KR" dirty="0">
-                <a:latin typeface="+mn-lt"/>
-                <a:ea typeface="+mj-ea"/>
-              </a:rPr>
-              <a:t>-&gt; Yes -&gt; </a:t>
-            </a:r>
-            <a:r>
-              <a:rPr lang="ko-KR" altLang="en-US" dirty="0">
-                <a:solidFill>
-                  <a:schemeClr val="tx2"/>
-                </a:solidFill>
-                <a:latin typeface="+mn-lt"/>
-                <a:ea typeface="+mj-ea"/>
-              </a:rPr>
-              <a:t>결과 </a:t>
-            </a:r>
-            <a:r>
-              <a:rPr lang="en-US" altLang="ko-KR" dirty="0">
-                <a:solidFill>
-                  <a:schemeClr val="tx2"/>
-                </a:solidFill>
-                <a:latin typeface="+mn-lt"/>
-                <a:ea typeface="+mj-ea"/>
-              </a:rPr>
-              <a:t>: </a:t>
-            </a:r>
-            <a:r>
-              <a:rPr lang="ko-KR" altLang="en-US" dirty="0">
-                <a:solidFill>
-                  <a:schemeClr val="tx2"/>
-                </a:solidFill>
-                <a:latin typeface="+mn-lt"/>
-                <a:ea typeface="+mj-ea"/>
-              </a:rPr>
-              <a:t>삭제 확인</a:t>
-            </a:r>
-            <a:endParaRPr lang="en-US" altLang="ko-KR" dirty="0">
-              <a:solidFill>
-                <a:schemeClr val="tx2"/>
-              </a:solidFill>
-              <a:latin typeface="+mn-lt"/>
-              <a:ea typeface="+mj-ea"/>
-            </a:endParaRPr>
-          </a:p>
-        </p:txBody>
-      </p:sp>
-      <p:sp>
-        <p:nvSpPr>
-          <p:cNvPr id="49154" name="제목 1"/>
-          <p:cNvSpPr>
-            <a:spLocks noGrp="1"/>
-          </p:cNvSpPr>
-          <p:nvPr>
-            <p:ph type="title"/>
-          </p:nvPr>
-        </p:nvSpPr>
-        <p:spPr bwMode="auto">
-          <a:noFill/>
-          <a:extLst>
-            <a:ext uri="{909E8E84-426E-40DD-AFC4-6F175D3DCCD1}">
-              <a14:hiddenFill xmlns:a14="http://schemas.microsoft.com/office/drawing/2010/main">
-                <a:solidFill>
-                  <a:srgbClr val="FFFFFF"/>
-                </a:solidFill>
-              </a14:hiddenFill>
-            </a:ext>
-            <a:ext uri="{91240B29-F687-4F45-9708-019B960494DF}">
-              <a14:hiddenLine xmlns:a14="http://schemas.microsoft.com/office/drawing/2010/main" w="9525">
-                <a:solidFill>
-                  <a:srgbClr val="000000"/>
-                </a:solidFill>
-                <a:miter lim="800000"/>
-                <a:headEnd/>
-                <a:tailEnd/>
-              </a14:hiddenLine>
-            </a:ext>
-          </a:extLst>
-        </p:spPr>
-        <p:txBody>
-          <a:bodyPr vert="horz" wrap="square" lIns="91440" tIns="45720" rIns="91440" bIns="45720" numCol="1" anchor="t" anchorCtr="0" compatLnSpc="1">
-            <a:prstTxWarp prst="textNoShape">
-              <a:avLst/>
-            </a:prstTxWarp>
-          </a:bodyPr>
-          <a:lstStyle/>
-          <a:p>
-            <a:r>
-              <a:rPr lang="en-US" altLang="ko-KR" dirty="0">
-                <a:latin typeface="+mn-lt"/>
-                <a:ea typeface="+mj-ea"/>
-              </a:rPr>
-              <a:t>8. </a:t>
-            </a:r>
-            <a:r>
-              <a:rPr lang="ko-KR" altLang="en-US" dirty="0">
-                <a:latin typeface="+mn-lt"/>
-                <a:ea typeface="+mj-ea"/>
-              </a:rPr>
-              <a:t>삭제</a:t>
-            </a:r>
-            <a:endParaRPr lang="ko-KR" altLang="en-US" sz="1400" dirty="0">
-              <a:latin typeface="+mn-lt"/>
-              <a:ea typeface="+mj-ea"/>
-            </a:endParaRPr>
-          </a:p>
-        </p:txBody>
-      </p:sp>
-      <p:pic>
-        <p:nvPicPr>
-          <p:cNvPr id="4" name="그림 3">
-            <a:extLst>
-              <a:ext uri="{FF2B5EF4-FFF2-40B4-BE49-F238E27FC236}">
-                <a16:creationId xmlns:a16="http://schemas.microsoft.com/office/drawing/2014/main" id="{D9AF6C22-7174-B65D-26A1-153C8D204360}"/>
-              </a:ext>
-            </a:extLst>
-          </p:cNvPr>
-          <p:cNvPicPr>
-            <a:picLocks noChangeAspect="1"/>
-          </p:cNvPicPr>
-          <p:nvPr/>
-        </p:nvPicPr>
-        <p:blipFill>
-          <a:blip r:embed="rId2"/>
-          <a:stretch>
-            <a:fillRect/>
-          </a:stretch>
-        </p:blipFill>
-        <p:spPr>
-          <a:xfrm>
-            <a:off x="1124622" y="1772816"/>
-            <a:ext cx="2511274" cy="4252317"/>
-          </a:xfrm>
-          <a:prstGeom prst="rect">
-            <a:avLst/>
-          </a:prstGeom>
-        </p:spPr>
-      </p:pic>
-      <p:pic>
-        <p:nvPicPr>
-          <p:cNvPr id="7" name="그림 6">
-            <a:extLst>
-              <a:ext uri="{FF2B5EF4-FFF2-40B4-BE49-F238E27FC236}">
-                <a16:creationId xmlns:a16="http://schemas.microsoft.com/office/drawing/2014/main" id="{75475F9E-C358-92C6-F699-AD69623834E7}"/>
-              </a:ext>
-            </a:extLst>
-          </p:cNvPr>
-          <p:cNvPicPr>
-            <a:picLocks noChangeAspect="1"/>
-          </p:cNvPicPr>
-          <p:nvPr/>
-        </p:nvPicPr>
-        <p:blipFill>
-          <a:blip r:embed="rId3"/>
-          <a:stretch>
-            <a:fillRect/>
-          </a:stretch>
-        </p:blipFill>
-        <p:spPr>
-          <a:xfrm>
-            <a:off x="4860032" y="2044415"/>
-            <a:ext cx="3289428" cy="952537"/>
-          </a:xfrm>
-          <a:prstGeom prst="rect">
-            <a:avLst/>
-          </a:prstGeom>
-        </p:spPr>
-      </p:pic>
-      <p:pic>
-        <p:nvPicPr>
-          <p:cNvPr id="9" name="그림 8">
-            <a:extLst>
-              <a:ext uri="{FF2B5EF4-FFF2-40B4-BE49-F238E27FC236}">
-                <a16:creationId xmlns:a16="http://schemas.microsoft.com/office/drawing/2014/main" id="{E1F4EE06-19F3-80C1-DED8-6A5C4F869B5B}"/>
-              </a:ext>
-            </a:extLst>
-          </p:cNvPr>
-          <p:cNvPicPr>
-            <a:picLocks noChangeAspect="1"/>
-          </p:cNvPicPr>
-          <p:nvPr/>
-        </p:nvPicPr>
-        <p:blipFill>
-          <a:blip r:embed="rId4"/>
-          <a:stretch>
-            <a:fillRect/>
-          </a:stretch>
-        </p:blipFill>
-        <p:spPr>
-          <a:xfrm>
-            <a:off x="5552653" y="4221088"/>
-            <a:ext cx="1971675" cy="1339602"/>
-          </a:xfrm>
-          <a:prstGeom prst="rect">
-            <a:avLst/>
-          </a:prstGeom>
-        </p:spPr>
-      </p:pic>
-      <p:cxnSp>
-        <p:nvCxnSpPr>
-          <p:cNvPr id="14" name="직선 화살표 연결선 13">
-            <a:extLst>
-              <a:ext uri="{FF2B5EF4-FFF2-40B4-BE49-F238E27FC236}">
-                <a16:creationId xmlns:a16="http://schemas.microsoft.com/office/drawing/2014/main" id="{BAAD1837-497D-E9B7-81B0-470D3854DBF0}"/>
-              </a:ext>
-            </a:extLst>
-          </p:cNvPr>
-          <p:cNvCxnSpPr>
-            <a:cxnSpLocks/>
-          </p:cNvCxnSpPr>
-          <p:nvPr/>
-        </p:nvCxnSpPr>
-        <p:spPr>
-          <a:xfrm>
-            <a:off x="3851920" y="2492896"/>
-            <a:ext cx="720080" cy="0"/>
-          </a:xfrm>
-          <a:prstGeom prst="straightConnector1">
-            <a:avLst/>
-          </a:prstGeom>
-          <a:ln>
-            <a:tailEnd type="triangle"/>
-          </a:ln>
-        </p:spPr>
-        <p:style>
-          <a:lnRef idx="1">
-            <a:schemeClr val="accent1"/>
-          </a:lnRef>
-          <a:fillRef idx="0">
-            <a:schemeClr val="accent1"/>
-          </a:fillRef>
-          <a:effectRef idx="0">
-            <a:schemeClr val="accent1"/>
-          </a:effectRef>
-          <a:fontRef idx="minor">
-            <a:schemeClr val="tx1"/>
-          </a:fontRef>
-        </p:style>
-      </p:cxnSp>
-      <p:cxnSp>
-        <p:nvCxnSpPr>
-          <p:cNvPr id="18" name="직선 화살표 연결선 17">
-            <a:extLst>
-              <a:ext uri="{FF2B5EF4-FFF2-40B4-BE49-F238E27FC236}">
-                <a16:creationId xmlns:a16="http://schemas.microsoft.com/office/drawing/2014/main" id="{6638BB9C-95A5-10B4-8D6D-0583FD1A42DD}"/>
-              </a:ext>
-            </a:extLst>
-          </p:cNvPr>
-          <p:cNvCxnSpPr/>
-          <p:nvPr/>
-        </p:nvCxnSpPr>
-        <p:spPr>
-          <a:xfrm>
-            <a:off x="6516216" y="3140968"/>
-            <a:ext cx="0" cy="792088"/>
-          </a:xfrm>
-          <a:prstGeom prst="straightConnector1">
-            <a:avLst/>
-          </a:prstGeom>
-          <a:ln>
-            <a:tailEnd type="triangle"/>
-          </a:ln>
-        </p:spPr>
-        <p:style>
-          <a:lnRef idx="1">
-            <a:schemeClr val="accent1"/>
-          </a:lnRef>
-          <a:fillRef idx="0">
-            <a:schemeClr val="accent1"/>
-          </a:fillRef>
-          <a:effectRef idx="0">
-            <a:schemeClr val="accent1"/>
-          </a:effectRef>
-          <a:fontRef idx="minor">
-            <a:schemeClr val="tx1"/>
-          </a:fontRef>
-        </p:style>
-      </p:cxnSp>
-    </p:spTree>
-    <p:extLst>
-      <p:ext uri="{BB962C8B-B14F-4D97-AF65-F5344CB8AC3E}">
-        <p14:creationId xmlns:p14="http://schemas.microsoft.com/office/powerpoint/2010/main" val="4115956093"/>
-      </p:ext>
-    </p:extLst>
-  </p:cSld>
-  <p:clrMapOvr>
-    <a:masterClrMapping/>
-  </p:clrMapOvr>
-</p:sld>
-</file>
-
 <file path=ppt/slides/slide2.xml><?xml version="1.0" encoding="utf-8"?>
 <p:sld xmlns:a="http://schemas.openxmlformats.org/drawingml/2006/main" xmlns:r="http://schemas.openxmlformats.org/officeDocument/2006/relationships" xmlns:p="http://schemas.openxmlformats.org/presentationml/2006/main">
   <p:cSld>
@@ -6373,15 +5999,40 @@
                 <a:latin typeface="+mn-lt"/>
                 <a:ea typeface="+mj-ea"/>
               </a:rPr>
-              <a:t>를 다운로드 합니다</a:t>
-            </a:r>
-            <a:r>
-              <a:rPr lang="en-US" altLang="ko-KR" dirty="0">
+              <a:t>를 다운로드 </a:t>
+            </a:r>
+            <a:r>
+              <a:rPr lang="ko-KR" altLang="en-US">
+                <a:latin typeface="+mn-lt"/>
+                <a:ea typeface="+mj-ea"/>
+              </a:rPr>
+              <a:t>합니다</a:t>
+            </a:r>
+            <a:r>
+              <a:rPr lang="en-US" altLang="ko-KR">
+                <a:latin typeface="+mn-lt"/>
+                <a:ea typeface="+mj-ea"/>
+              </a:rPr>
+              <a:t>. Maven Repository</a:t>
+            </a:r>
+            <a:r>
+              <a:rPr lang="ko-KR" altLang="en-US">
+                <a:latin typeface="+mn-lt"/>
+                <a:ea typeface="+mj-ea"/>
+              </a:rPr>
+              <a:t>에서 최신 드라이버가 다운로드 됩니다</a:t>
+            </a:r>
+            <a:r>
+              <a:rPr lang="en-US" altLang="ko-KR">
                 <a:latin typeface="+mn-lt"/>
                 <a:ea typeface="+mj-ea"/>
               </a:rPr>
               <a:t>.</a:t>
             </a:r>
+            <a:endParaRPr lang="en-US" altLang="ko-KR" dirty="0">
+              <a:latin typeface="+mn-lt"/>
+              <a:ea typeface="+mj-ea"/>
+            </a:endParaRPr>
           </a:p>
           <a:p>
             <a:pPr marL="0" indent="0">
@@ -10323,12 +9974,6 @@
 </file>
 
 <file path=customXml/item1.xml><?xml version="1.0" encoding="utf-8"?>
-<p:properties xmlns:p="http://schemas.microsoft.com/office/2006/metadata/properties" xmlns:xsi="http://www.w3.org/2001/XMLSchema-instance" xmlns:pc="http://schemas.microsoft.com/office/infopath/2007/PartnerControls">
-  <documentManagement/>
-</p:properties>
-</file>
-
-<file path=customXml/item2.xml><?xml version="1.0" encoding="utf-8"?>
 <ct:contentTypeSchema xmlns:ct="http://schemas.microsoft.com/office/2006/metadata/contentType" xmlns:ma="http://schemas.microsoft.com/office/2006/metadata/properties/metaAttributes" ct:_="" ma:_="" ma:contentTypeName="문서" ma:contentTypeID="0x01010094045299AFDCA045855F8344FFFCB4B4" ma:contentTypeVersion="0" ma:contentTypeDescription="새 문서를 만듭니다." ma:contentTypeScope="" ma:versionID="48340f7fc8974c11d41f573f4a5aa434">
   <xsd:schema xmlns:xsd="http://www.w3.org/2001/XMLSchema" xmlns:p="http://schemas.microsoft.com/office/2006/metadata/properties" targetNamespace="http://schemas.microsoft.com/office/2006/metadata/properties" ma:root="true" ma:fieldsID="6d1ee5c80bf69a1ee28e268965e8a726">
     <xsd:element name="properties">
@@ -10377,6 +10022,12 @@
 </ct:contentTypeSchema>
 </file>
 
+<file path=customXml/item2.xml><?xml version="1.0" encoding="utf-8"?>
+<p:properties xmlns:p="http://schemas.microsoft.com/office/2006/metadata/properties" xmlns:xsi="http://www.w3.org/2001/XMLSchema-instance" xmlns:pc="http://schemas.microsoft.com/office/infopath/2007/PartnerControls">
+  <documentManagement/>
+</p:properties>
+</file>
+
 <file path=customXml/item3.xml><?xml version="1.0" encoding="utf-8"?>
 <?mso-contentType ?>
 <FormTemplates xmlns="http://schemas.microsoft.com/sharepoint/v3/contenttype/forms">
@@ -10387,6 +10038,21 @@
 </file>
 
 <file path=customXml/itemProps1.xml><?xml version="1.0" encoding="utf-8"?>
+<ds:datastoreItem xmlns:ds="http://schemas.openxmlformats.org/officeDocument/2006/customXml" ds:itemID="{4BE7663C-9F19-41FD-9D3F-084CE93354FA}">
+  <ds:schemaRefs>
+    <ds:schemaRef ds:uri="http://schemas.microsoft.com/office/2006/metadata/contentType"/>
+    <ds:schemaRef ds:uri="http://schemas.microsoft.com/office/2006/metadata/properties/metaAttributes"/>
+    <ds:schemaRef ds:uri="http://www.w3.org/2001/XMLSchema"/>
+    <ds:schemaRef ds:uri="http://schemas.microsoft.com/office/2006/metadata/properties"/>
+    <ds:schemaRef ds:uri="http://schemas.openxmlformats.org/package/2006/metadata/core-properties"/>
+    <ds:schemaRef ds:uri="http://purl.org/dc/elements/1.1/"/>
+    <ds:schemaRef ds:uri="http://purl.org/dc/terms/"/>
+    <ds:schemaRef ds:uri="http://schemas.microsoft.com/office/internal/2005/internalDocumentation"/>
+  </ds:schemaRefs>
+</ds:datastoreItem>
+</file>
+
+<file path=customXml/itemProps2.xml><?xml version="1.0" encoding="utf-8"?>
 <ds:datastoreItem xmlns:ds="http://schemas.openxmlformats.org/officeDocument/2006/customXml" ds:itemID="{2930EFD6-240A-4E79-92AB-0E3FAF99B1B1}">
   <ds:schemaRefs>
     <ds:schemaRef ds:uri="http://purl.org/dc/dcmitype/"/>
@@ -10401,21 +10067,6 @@
 </ds:datastoreItem>
 </file>
 
-<file path=customXml/itemProps2.xml><?xml version="1.0" encoding="utf-8"?>
-<ds:datastoreItem xmlns:ds="http://schemas.openxmlformats.org/officeDocument/2006/customXml" ds:itemID="{4BE7663C-9F19-41FD-9D3F-084CE93354FA}">
-  <ds:schemaRefs>
-    <ds:schemaRef ds:uri="http://schemas.microsoft.com/office/2006/metadata/contentType"/>
-    <ds:schemaRef ds:uri="http://schemas.microsoft.com/office/2006/metadata/properties/metaAttributes"/>
-    <ds:schemaRef ds:uri="http://www.w3.org/2001/XMLSchema"/>
-    <ds:schemaRef ds:uri="http://schemas.microsoft.com/office/2006/metadata/properties"/>
-    <ds:schemaRef ds:uri="http://schemas.openxmlformats.org/package/2006/metadata/core-properties"/>
-    <ds:schemaRef ds:uri="http://purl.org/dc/elements/1.1/"/>
-    <ds:schemaRef ds:uri="http://purl.org/dc/terms/"/>
-    <ds:schemaRef ds:uri="http://schemas.microsoft.com/office/internal/2005/internalDocumentation"/>
-  </ds:schemaRefs>
-</ds:datastoreItem>
-</file>
-
 <file path=customXml/itemProps3.xml><?xml version="1.0" encoding="utf-8"?>
 <ds:datastoreItem xmlns:ds="http://schemas.openxmlformats.org/officeDocument/2006/customXml" ds:itemID="{290F850F-1707-4042-B785-91620C10ADD0}">
   <ds:schemaRefs>

</xml_diff>